<commit_message>
edits from last session
</commit_message>
<xml_diff>
--- a/mlnd/Session 07a.pptx
+++ b/mlnd/Session 07a.pptx
@@ -863,7 +863,7 @@
         </p:nvSpPr>
         <p:spPr>
           <a:xfrm>
-            <a:off x="381300" y="685800"/>
+            <a:off x="381000" y="685800"/>
             <a:ext cx="6096000" cy="3429000"/>
           </a:xfrm>
           <a:custGeom>
@@ -1342,7 +1342,7 @@
               </a:spcAft>
               <a:buNone/>
             </a:pPr>
-            <a:endParaRPr/>
+            <a:endParaRPr dirty="0"/>
           </a:p>
         </p:txBody>
       </p:sp>
@@ -26655,7 +26655,7 @@
         </p:nvGraphicFramePr>
         <p:xfrm>
           <a:off x="955588" y="900010"/>
-          <a:ext cx="3000000" cy="3000000"/>
+          <a:ext cx="7232825" cy="3230450"/>
         </p:xfrm>
         <a:graphic>
           <a:graphicData uri="http://schemas.openxmlformats.org/drawingml/2006/table">
@@ -28770,7 +28770,7 @@
         </p:nvGraphicFramePr>
         <p:xfrm>
           <a:off x="952500" y="3136350"/>
-          <a:ext cx="3000000" cy="3000000"/>
+          <a:ext cx="7239000" cy="914340"/>
         </p:xfrm>
         <a:graphic>
           <a:graphicData uri="http://schemas.openxmlformats.org/drawingml/2006/table">
@@ -32199,7 +32199,7 @@
         </p:nvGraphicFramePr>
         <p:xfrm>
           <a:off x="485539" y="1238095"/>
-          <a:ext cx="3000000" cy="3000000"/>
+          <a:ext cx="8371400" cy="3731150"/>
         </p:xfrm>
         <a:graphic>
           <a:graphicData uri="http://schemas.openxmlformats.org/drawingml/2006/table">

</xml_diff>